<commit_message>
Upload Deep Ranking version
</commit_message>
<xml_diff>
--- a/test_4.pptx
+++ b/test_4.pptx
@@ -9,19 +9,6 @@
     <p:sldId id="257" r:id="rId8"/>
     <p:sldId id="258" r:id="rId9"/>
     <p:sldId id="259" r:id="rId10"/>
-    <p:sldId id="260" r:id="rId11"/>
-    <p:sldId id="261" r:id="rId12"/>
-    <p:sldId id="262" r:id="rId13"/>
-    <p:sldId id="263" r:id="rId14"/>
-    <p:sldId id="264" r:id="rId15"/>
-    <p:sldId id="265" r:id="rId16"/>
-    <p:sldId id="266" r:id="rId17"/>
-    <p:sldId id="267" r:id="rId18"/>
-    <p:sldId id="268" r:id="rId19"/>
-    <p:sldId id="269" r:id="rId20"/>
-    <p:sldId id="270" r:id="rId21"/>
-    <p:sldId id="271" r:id="rId22"/>
-    <p:sldId id="272" r:id="rId23"/>
   </p:sldIdLst>
   <p:sldSz cx="9144000" cy="6858000" type="screen4x3"/>
   <p:notesSz cx="6858000" cy="9144000"/>
@@ -3121,343 +3108,7 @@
         <p:spPr>
           <a:xfrm>
             <a:off x="457200" y="914400"/>
-            <a:ext cx="6117996" cy="4572000"/>
-          </a:xfrm>
-          <a:prstGeom prst="rect">
-            <a:avLst/>
-          </a:prstGeom>
-        </p:spPr>
-      </p:pic>
-    </p:spTree>
-  </p:cSld>
-  <p:clrMapOvr>
-    <a:masterClrMapping/>
-  </p:clrMapOvr>
-</p:sld>
-</file>
-
-<file path=ppt/slides/slide10.xml><?xml version="1.0" encoding="utf-8"?>
-<p:sld xmlns:a="http://schemas.openxmlformats.org/drawingml/2006/main" xmlns:p="http://schemas.openxmlformats.org/presentationml/2006/main" xmlns:r="http://schemas.openxmlformats.org/officeDocument/2006/relationships">
-  <p:cSld>
-    <p:spTree>
-      <p:nvGrpSpPr>
-        <p:cNvPr id="1" name=""/>
-        <p:cNvGrpSpPr/>
-        <p:nvPr/>
-      </p:nvGrpSpPr>
-      <p:grpSpPr/>
-      <p:pic>
-        <p:nvPicPr>
-          <p:cNvPr id="2" name="Picture 1" descr="test2.png"/>
-          <p:cNvPicPr>
-            <a:picLocks noChangeAspect="1"/>
-          </p:cNvPicPr>
-          <p:nvPr/>
-        </p:nvPicPr>
-        <p:blipFill>
-          <a:blip r:embed="rId2"/>
-          <a:stretch>
-            <a:fillRect/>
-          </a:stretch>
-        </p:blipFill>
-        <p:spPr>
-          <a:xfrm>
-            <a:off x="457200" y="914400"/>
-            <a:ext cx="6117996" cy="4572000"/>
-          </a:xfrm>
-          <a:prstGeom prst="rect">
-            <a:avLst/>
-          </a:prstGeom>
-        </p:spPr>
-      </p:pic>
-    </p:spTree>
-  </p:cSld>
-  <p:clrMapOvr>
-    <a:masterClrMapping/>
-  </p:clrMapOvr>
-</p:sld>
-</file>
-
-<file path=ppt/slides/slide11.xml><?xml version="1.0" encoding="utf-8"?>
-<p:sld xmlns:a="http://schemas.openxmlformats.org/drawingml/2006/main" xmlns:p="http://schemas.openxmlformats.org/presentationml/2006/main" xmlns:r="http://schemas.openxmlformats.org/officeDocument/2006/relationships">
-  <p:cSld>
-    <p:spTree>
-      <p:nvGrpSpPr>
-        <p:cNvPr id="1" name=""/>
-        <p:cNvGrpSpPr/>
-        <p:nvPr/>
-      </p:nvGrpSpPr>
-      <p:grpSpPr/>
-      <p:pic>
-        <p:nvPicPr>
-          <p:cNvPr id="2" name="Picture 1" descr="test2.png"/>
-          <p:cNvPicPr>
-            <a:picLocks noChangeAspect="1"/>
-          </p:cNvPicPr>
-          <p:nvPr/>
-        </p:nvPicPr>
-        <p:blipFill>
-          <a:blip r:embed="rId2"/>
-          <a:stretch>
-            <a:fillRect/>
-          </a:stretch>
-        </p:blipFill>
-        <p:spPr>
-          <a:xfrm>
-            <a:off x="457200" y="914400"/>
-            <a:ext cx="6117996" cy="4572000"/>
-          </a:xfrm>
-          <a:prstGeom prst="rect">
-            <a:avLst/>
-          </a:prstGeom>
-        </p:spPr>
-      </p:pic>
-    </p:spTree>
-  </p:cSld>
-  <p:clrMapOvr>
-    <a:masterClrMapping/>
-  </p:clrMapOvr>
-</p:sld>
-</file>
-
-<file path=ppt/slides/slide12.xml><?xml version="1.0" encoding="utf-8"?>
-<p:sld xmlns:a="http://schemas.openxmlformats.org/drawingml/2006/main" xmlns:p="http://schemas.openxmlformats.org/presentationml/2006/main" xmlns:r="http://schemas.openxmlformats.org/officeDocument/2006/relationships">
-  <p:cSld>
-    <p:spTree>
-      <p:nvGrpSpPr>
-        <p:cNvPr id="1" name=""/>
-        <p:cNvGrpSpPr/>
-        <p:nvPr/>
-      </p:nvGrpSpPr>
-      <p:grpSpPr/>
-      <p:pic>
-        <p:nvPicPr>
-          <p:cNvPr id="2" name="Picture 1" descr="test2.png"/>
-          <p:cNvPicPr>
-            <a:picLocks noChangeAspect="1"/>
-          </p:cNvPicPr>
-          <p:nvPr/>
-        </p:nvPicPr>
-        <p:blipFill>
-          <a:blip r:embed="rId2"/>
-          <a:stretch>
-            <a:fillRect/>
-          </a:stretch>
-        </p:blipFill>
-        <p:spPr>
-          <a:xfrm>
-            <a:off x="457200" y="914400"/>
-            <a:ext cx="6117996" cy="4572000"/>
-          </a:xfrm>
-          <a:prstGeom prst="rect">
-            <a:avLst/>
-          </a:prstGeom>
-        </p:spPr>
-      </p:pic>
-    </p:spTree>
-  </p:cSld>
-  <p:clrMapOvr>
-    <a:masterClrMapping/>
-  </p:clrMapOvr>
-</p:sld>
-</file>
-
-<file path=ppt/slides/slide13.xml><?xml version="1.0" encoding="utf-8"?>
-<p:sld xmlns:a="http://schemas.openxmlformats.org/drawingml/2006/main" xmlns:p="http://schemas.openxmlformats.org/presentationml/2006/main" xmlns:r="http://schemas.openxmlformats.org/officeDocument/2006/relationships">
-  <p:cSld>
-    <p:spTree>
-      <p:nvGrpSpPr>
-        <p:cNvPr id="1" name=""/>
-        <p:cNvGrpSpPr/>
-        <p:nvPr/>
-      </p:nvGrpSpPr>
-      <p:grpSpPr/>
-      <p:pic>
-        <p:nvPicPr>
-          <p:cNvPr id="2" name="Picture 1" descr="test2.png"/>
-          <p:cNvPicPr>
-            <a:picLocks noChangeAspect="1"/>
-          </p:cNvPicPr>
-          <p:nvPr/>
-        </p:nvPicPr>
-        <p:blipFill>
-          <a:blip r:embed="rId2"/>
-          <a:stretch>
-            <a:fillRect/>
-          </a:stretch>
-        </p:blipFill>
-        <p:spPr>
-          <a:xfrm>
-            <a:off x="457200" y="914400"/>
-            <a:ext cx="6117996" cy="4572000"/>
-          </a:xfrm>
-          <a:prstGeom prst="rect">
-            <a:avLst/>
-          </a:prstGeom>
-        </p:spPr>
-      </p:pic>
-    </p:spTree>
-  </p:cSld>
-  <p:clrMapOvr>
-    <a:masterClrMapping/>
-  </p:clrMapOvr>
-</p:sld>
-</file>
-
-<file path=ppt/slides/slide14.xml><?xml version="1.0" encoding="utf-8"?>
-<p:sld xmlns:a="http://schemas.openxmlformats.org/drawingml/2006/main" xmlns:p="http://schemas.openxmlformats.org/presentationml/2006/main" xmlns:r="http://schemas.openxmlformats.org/officeDocument/2006/relationships">
-  <p:cSld>
-    <p:spTree>
-      <p:nvGrpSpPr>
-        <p:cNvPr id="1" name=""/>
-        <p:cNvGrpSpPr/>
-        <p:nvPr/>
-      </p:nvGrpSpPr>
-      <p:grpSpPr/>
-      <p:pic>
-        <p:nvPicPr>
-          <p:cNvPr id="2" name="Picture 1" descr="test2.png"/>
-          <p:cNvPicPr>
-            <a:picLocks noChangeAspect="1"/>
-          </p:cNvPicPr>
-          <p:nvPr/>
-        </p:nvPicPr>
-        <p:blipFill>
-          <a:blip r:embed="rId2"/>
-          <a:stretch>
-            <a:fillRect/>
-          </a:stretch>
-        </p:blipFill>
-        <p:spPr>
-          <a:xfrm>
-            <a:off x="457200" y="914400"/>
-            <a:ext cx="6117996" cy="4572000"/>
-          </a:xfrm>
-          <a:prstGeom prst="rect">
-            <a:avLst/>
-          </a:prstGeom>
-        </p:spPr>
-      </p:pic>
-    </p:spTree>
-  </p:cSld>
-  <p:clrMapOvr>
-    <a:masterClrMapping/>
-  </p:clrMapOvr>
-</p:sld>
-</file>
-
-<file path=ppt/slides/slide15.xml><?xml version="1.0" encoding="utf-8"?>
-<p:sld xmlns:a="http://schemas.openxmlformats.org/drawingml/2006/main" xmlns:p="http://schemas.openxmlformats.org/presentationml/2006/main" xmlns:r="http://schemas.openxmlformats.org/officeDocument/2006/relationships">
-  <p:cSld>
-    <p:spTree>
-      <p:nvGrpSpPr>
-        <p:cNvPr id="1" name=""/>
-        <p:cNvGrpSpPr/>
-        <p:nvPr/>
-      </p:nvGrpSpPr>
-      <p:grpSpPr/>
-      <p:pic>
-        <p:nvPicPr>
-          <p:cNvPr id="2" name="Picture 1" descr="test2.png"/>
-          <p:cNvPicPr>
-            <a:picLocks noChangeAspect="1"/>
-          </p:cNvPicPr>
-          <p:nvPr/>
-        </p:nvPicPr>
-        <p:blipFill>
-          <a:blip r:embed="rId2"/>
-          <a:stretch>
-            <a:fillRect/>
-          </a:stretch>
-        </p:blipFill>
-        <p:spPr>
-          <a:xfrm>
-            <a:off x="457200" y="914400"/>
-            <a:ext cx="6117996" cy="4572000"/>
-          </a:xfrm>
-          <a:prstGeom prst="rect">
-            <a:avLst/>
-          </a:prstGeom>
-        </p:spPr>
-      </p:pic>
-    </p:spTree>
-  </p:cSld>
-  <p:clrMapOvr>
-    <a:masterClrMapping/>
-  </p:clrMapOvr>
-</p:sld>
-</file>
-
-<file path=ppt/slides/slide16.xml><?xml version="1.0" encoding="utf-8"?>
-<p:sld xmlns:a="http://schemas.openxmlformats.org/drawingml/2006/main" xmlns:p="http://schemas.openxmlformats.org/presentationml/2006/main" xmlns:r="http://schemas.openxmlformats.org/officeDocument/2006/relationships">
-  <p:cSld>
-    <p:spTree>
-      <p:nvGrpSpPr>
-        <p:cNvPr id="1" name=""/>
-        <p:cNvGrpSpPr/>
-        <p:nvPr/>
-      </p:nvGrpSpPr>
-      <p:grpSpPr/>
-      <p:pic>
-        <p:nvPicPr>
-          <p:cNvPr id="2" name="Picture 1" descr="test2.png"/>
-          <p:cNvPicPr>
-            <a:picLocks noChangeAspect="1"/>
-          </p:cNvPicPr>
-          <p:nvPr/>
-        </p:nvPicPr>
-        <p:blipFill>
-          <a:blip r:embed="rId2"/>
-          <a:stretch>
-            <a:fillRect/>
-          </a:stretch>
-        </p:blipFill>
-        <p:spPr>
-          <a:xfrm>
-            <a:off x="457200" y="914400"/>
-            <a:ext cx="6117996" cy="4572000"/>
-          </a:xfrm>
-          <a:prstGeom prst="rect">
-            <a:avLst/>
-          </a:prstGeom>
-        </p:spPr>
-      </p:pic>
-    </p:spTree>
-  </p:cSld>
-  <p:clrMapOvr>
-    <a:masterClrMapping/>
-  </p:clrMapOvr>
-</p:sld>
-</file>
-
-<file path=ppt/slides/slide17.xml><?xml version="1.0" encoding="utf-8"?>
-<p:sld xmlns:a="http://schemas.openxmlformats.org/drawingml/2006/main" xmlns:p="http://schemas.openxmlformats.org/presentationml/2006/main" xmlns:r="http://schemas.openxmlformats.org/officeDocument/2006/relationships">
-  <p:cSld>
-    <p:spTree>
-      <p:nvGrpSpPr>
-        <p:cNvPr id="1" name=""/>
-        <p:cNvGrpSpPr/>
-        <p:nvPr/>
-      </p:nvGrpSpPr>
-      <p:grpSpPr/>
-      <p:pic>
-        <p:nvPicPr>
-          <p:cNvPr id="2" name="Picture 1" descr="test2.png"/>
-          <p:cNvPicPr>
-            <a:picLocks noChangeAspect="1"/>
-          </p:cNvPicPr>
-          <p:nvPr/>
-        </p:nvPicPr>
-        <p:blipFill>
-          <a:blip r:embed="rId2"/>
-          <a:stretch>
-            <a:fillRect/>
-          </a:stretch>
-        </p:blipFill>
-        <p:spPr>
-          <a:xfrm>
-            <a:off x="457200" y="914400"/>
-            <a:ext cx="6117996" cy="4572000"/>
+            <a:ext cx="5546651" cy="4572000"/>
           </a:xfrm>
           <a:prstGeom prst="rect">
             <a:avLst/>
@@ -3499,7 +3150,7 @@
         <p:spPr>
           <a:xfrm>
             <a:off x="457200" y="914400"/>
-            <a:ext cx="6117996" cy="4572000"/>
+            <a:ext cx="5546651" cy="4572000"/>
           </a:xfrm>
           <a:prstGeom prst="rect">
             <a:avLst/>
@@ -3541,7 +3192,7 @@
         <p:spPr>
           <a:xfrm>
             <a:off x="457200" y="914400"/>
-            <a:ext cx="6117996" cy="4572000"/>
+            <a:ext cx="5546651" cy="4572000"/>
           </a:xfrm>
           <a:prstGeom prst="rect">
             <a:avLst/>
@@ -3583,217 +3234,7 @@
         <p:spPr>
           <a:xfrm>
             <a:off x="457200" y="914400"/>
-            <a:ext cx="6117996" cy="4572000"/>
-          </a:xfrm>
-          <a:prstGeom prst="rect">
-            <a:avLst/>
-          </a:prstGeom>
-        </p:spPr>
-      </p:pic>
-    </p:spTree>
-  </p:cSld>
-  <p:clrMapOvr>
-    <a:masterClrMapping/>
-  </p:clrMapOvr>
-</p:sld>
-</file>
-
-<file path=ppt/slides/slide5.xml><?xml version="1.0" encoding="utf-8"?>
-<p:sld xmlns:a="http://schemas.openxmlformats.org/drawingml/2006/main" xmlns:p="http://schemas.openxmlformats.org/presentationml/2006/main" xmlns:r="http://schemas.openxmlformats.org/officeDocument/2006/relationships">
-  <p:cSld>
-    <p:spTree>
-      <p:nvGrpSpPr>
-        <p:cNvPr id="1" name=""/>
-        <p:cNvGrpSpPr/>
-        <p:nvPr/>
-      </p:nvGrpSpPr>
-      <p:grpSpPr/>
-      <p:pic>
-        <p:nvPicPr>
-          <p:cNvPr id="2" name="Picture 1" descr="test2.png"/>
-          <p:cNvPicPr>
-            <a:picLocks noChangeAspect="1"/>
-          </p:cNvPicPr>
-          <p:nvPr/>
-        </p:nvPicPr>
-        <p:blipFill>
-          <a:blip r:embed="rId2"/>
-          <a:stretch>
-            <a:fillRect/>
-          </a:stretch>
-        </p:blipFill>
-        <p:spPr>
-          <a:xfrm>
-            <a:off x="457200" y="914400"/>
-            <a:ext cx="6117996" cy="4572000"/>
-          </a:xfrm>
-          <a:prstGeom prst="rect">
-            <a:avLst/>
-          </a:prstGeom>
-        </p:spPr>
-      </p:pic>
-    </p:spTree>
-  </p:cSld>
-  <p:clrMapOvr>
-    <a:masterClrMapping/>
-  </p:clrMapOvr>
-</p:sld>
-</file>
-
-<file path=ppt/slides/slide6.xml><?xml version="1.0" encoding="utf-8"?>
-<p:sld xmlns:a="http://schemas.openxmlformats.org/drawingml/2006/main" xmlns:p="http://schemas.openxmlformats.org/presentationml/2006/main" xmlns:r="http://schemas.openxmlformats.org/officeDocument/2006/relationships">
-  <p:cSld>
-    <p:spTree>
-      <p:nvGrpSpPr>
-        <p:cNvPr id="1" name=""/>
-        <p:cNvGrpSpPr/>
-        <p:nvPr/>
-      </p:nvGrpSpPr>
-      <p:grpSpPr/>
-      <p:pic>
-        <p:nvPicPr>
-          <p:cNvPr id="2" name="Picture 1" descr="test2.png"/>
-          <p:cNvPicPr>
-            <a:picLocks noChangeAspect="1"/>
-          </p:cNvPicPr>
-          <p:nvPr/>
-        </p:nvPicPr>
-        <p:blipFill>
-          <a:blip r:embed="rId2"/>
-          <a:stretch>
-            <a:fillRect/>
-          </a:stretch>
-        </p:blipFill>
-        <p:spPr>
-          <a:xfrm>
-            <a:off x="457200" y="914400"/>
-            <a:ext cx="6117996" cy="4572000"/>
-          </a:xfrm>
-          <a:prstGeom prst="rect">
-            <a:avLst/>
-          </a:prstGeom>
-        </p:spPr>
-      </p:pic>
-    </p:spTree>
-  </p:cSld>
-  <p:clrMapOvr>
-    <a:masterClrMapping/>
-  </p:clrMapOvr>
-</p:sld>
-</file>
-
-<file path=ppt/slides/slide7.xml><?xml version="1.0" encoding="utf-8"?>
-<p:sld xmlns:a="http://schemas.openxmlformats.org/drawingml/2006/main" xmlns:p="http://schemas.openxmlformats.org/presentationml/2006/main" xmlns:r="http://schemas.openxmlformats.org/officeDocument/2006/relationships">
-  <p:cSld>
-    <p:spTree>
-      <p:nvGrpSpPr>
-        <p:cNvPr id="1" name=""/>
-        <p:cNvGrpSpPr/>
-        <p:nvPr/>
-      </p:nvGrpSpPr>
-      <p:grpSpPr/>
-      <p:pic>
-        <p:nvPicPr>
-          <p:cNvPr id="2" name="Picture 1" descr="test2.png"/>
-          <p:cNvPicPr>
-            <a:picLocks noChangeAspect="1"/>
-          </p:cNvPicPr>
-          <p:nvPr/>
-        </p:nvPicPr>
-        <p:blipFill>
-          <a:blip r:embed="rId2"/>
-          <a:stretch>
-            <a:fillRect/>
-          </a:stretch>
-        </p:blipFill>
-        <p:spPr>
-          <a:xfrm>
-            <a:off x="457200" y="914400"/>
-            <a:ext cx="6117996" cy="4572000"/>
-          </a:xfrm>
-          <a:prstGeom prst="rect">
-            <a:avLst/>
-          </a:prstGeom>
-        </p:spPr>
-      </p:pic>
-    </p:spTree>
-  </p:cSld>
-  <p:clrMapOvr>
-    <a:masterClrMapping/>
-  </p:clrMapOvr>
-</p:sld>
-</file>
-
-<file path=ppt/slides/slide8.xml><?xml version="1.0" encoding="utf-8"?>
-<p:sld xmlns:a="http://schemas.openxmlformats.org/drawingml/2006/main" xmlns:p="http://schemas.openxmlformats.org/presentationml/2006/main" xmlns:r="http://schemas.openxmlformats.org/officeDocument/2006/relationships">
-  <p:cSld>
-    <p:spTree>
-      <p:nvGrpSpPr>
-        <p:cNvPr id="1" name=""/>
-        <p:cNvGrpSpPr/>
-        <p:nvPr/>
-      </p:nvGrpSpPr>
-      <p:grpSpPr/>
-      <p:pic>
-        <p:nvPicPr>
-          <p:cNvPr id="2" name="Picture 1" descr="test2.png"/>
-          <p:cNvPicPr>
-            <a:picLocks noChangeAspect="1"/>
-          </p:cNvPicPr>
-          <p:nvPr/>
-        </p:nvPicPr>
-        <p:blipFill>
-          <a:blip r:embed="rId2"/>
-          <a:stretch>
-            <a:fillRect/>
-          </a:stretch>
-        </p:blipFill>
-        <p:spPr>
-          <a:xfrm>
-            <a:off x="457200" y="914400"/>
-            <a:ext cx="6117996" cy="4572000"/>
-          </a:xfrm>
-          <a:prstGeom prst="rect">
-            <a:avLst/>
-          </a:prstGeom>
-        </p:spPr>
-      </p:pic>
-    </p:spTree>
-  </p:cSld>
-  <p:clrMapOvr>
-    <a:masterClrMapping/>
-  </p:clrMapOvr>
-</p:sld>
-</file>
-
-<file path=ppt/slides/slide9.xml><?xml version="1.0" encoding="utf-8"?>
-<p:sld xmlns:a="http://schemas.openxmlformats.org/drawingml/2006/main" xmlns:p="http://schemas.openxmlformats.org/presentationml/2006/main" xmlns:r="http://schemas.openxmlformats.org/officeDocument/2006/relationships">
-  <p:cSld>
-    <p:spTree>
-      <p:nvGrpSpPr>
-        <p:cNvPr id="1" name=""/>
-        <p:cNvGrpSpPr/>
-        <p:nvPr/>
-      </p:nvGrpSpPr>
-      <p:grpSpPr/>
-      <p:pic>
-        <p:nvPicPr>
-          <p:cNvPr id="2" name="Picture 1" descr="test2.png"/>
-          <p:cNvPicPr>
-            <a:picLocks noChangeAspect="1"/>
-          </p:cNvPicPr>
-          <p:nvPr/>
-        </p:nvPicPr>
-        <p:blipFill>
-          <a:blip r:embed="rId2"/>
-          <a:stretch>
-            <a:fillRect/>
-          </a:stretch>
-        </p:blipFill>
-        <p:spPr>
-          <a:xfrm>
-            <a:off x="457200" y="914400"/>
-            <a:ext cx="6117996" cy="4572000"/>
+            <a:ext cx="5546651" cy="4572000"/>
           </a:xfrm>
           <a:prstGeom prst="rect">
             <a:avLst/>

</xml_diff>

<commit_message>
Update notebook with mse
</commit_message>
<xml_diff>
--- a/test_4.pptx
+++ b/test_4.pptx
@@ -3108,7 +3108,7 @@
         <p:spPr>
           <a:xfrm>
             <a:off x="457200" y="914400"/>
-            <a:ext cx="5546651" cy="4572000"/>
+            <a:ext cx="8247980" cy="4572000"/>
           </a:xfrm>
           <a:prstGeom prst="rect">
             <a:avLst/>
@@ -3150,7 +3150,7 @@
         <p:spPr>
           <a:xfrm>
             <a:off x="457200" y="914400"/>
-            <a:ext cx="5546651" cy="4572000"/>
+            <a:ext cx="8247980" cy="4572000"/>
           </a:xfrm>
           <a:prstGeom prst="rect">
             <a:avLst/>
@@ -3192,7 +3192,7 @@
         <p:spPr>
           <a:xfrm>
             <a:off x="457200" y="914400"/>
-            <a:ext cx="5546651" cy="4572000"/>
+            <a:ext cx="8247980" cy="4572000"/>
           </a:xfrm>
           <a:prstGeom prst="rect">
             <a:avLst/>
@@ -3234,7 +3234,7 @@
         <p:spPr>
           <a:xfrm>
             <a:off x="457200" y="914400"/>
-            <a:ext cx="5546651" cy="4572000"/>
+            <a:ext cx="8247980" cy="4572000"/>
           </a:xfrm>
           <a:prstGeom prst="rect">
             <a:avLst/>

</xml_diff>